<commit_message>
add results by Google Colab pro plus and update parsing.py
</commit_message>
<xml_diff>
--- a/otmm_decimal/result_colab/result_existing_5195_1.0_6_59_ColabFree/result_existing_5195_1.0_6_59_parsing.pptx
+++ b/otmm_decimal/result_colab/result_existing_5195_1.0_6_59_ColabFree/result_existing_5195_1.0_6_59_parsing.pptx
@@ -262,7 +262,7 @@
           <a:p>
             <a:fld id="{A1CCF42C-534B-4F17-84EB-3026585EF5A2}" type="datetimeFigureOut">
               <a:rPr kumimoji="1" lang="ja-JP" altLang="en-US" smtClean="0"/>
-              <a:t>2022/12/27</a:t>
+              <a:t>2022/12/29</a:t>
             </a:fld>
             <a:endParaRPr kumimoji="1" lang="ja-JP" altLang="en-US"/>
           </a:p>
@@ -492,7 +492,7 @@
           <a:p>
             <a:fld id="{A1CCF42C-534B-4F17-84EB-3026585EF5A2}" type="datetimeFigureOut">
               <a:rPr kumimoji="1" lang="ja-JP" altLang="en-US" smtClean="0"/>
-              <a:t>2022/12/27</a:t>
+              <a:t>2022/12/29</a:t>
             </a:fld>
             <a:endParaRPr kumimoji="1" lang="ja-JP" altLang="en-US"/>
           </a:p>
@@ -732,7 +732,7 @@
           <a:p>
             <a:fld id="{A1CCF42C-534B-4F17-84EB-3026585EF5A2}" type="datetimeFigureOut">
               <a:rPr kumimoji="1" lang="ja-JP" altLang="en-US" smtClean="0"/>
-              <a:t>2022/12/27</a:t>
+              <a:t>2022/12/29</a:t>
             </a:fld>
             <a:endParaRPr kumimoji="1" lang="ja-JP" altLang="en-US"/>
           </a:p>
@@ -962,7 +962,7 @@
           <a:p>
             <a:fld id="{A1CCF42C-534B-4F17-84EB-3026585EF5A2}" type="datetimeFigureOut">
               <a:rPr kumimoji="1" lang="ja-JP" altLang="en-US" smtClean="0"/>
-              <a:t>2022/12/27</a:t>
+              <a:t>2022/12/29</a:t>
             </a:fld>
             <a:endParaRPr kumimoji="1" lang="ja-JP" altLang="en-US"/>
           </a:p>
@@ -1237,7 +1237,7 @@
           <a:p>
             <a:fld id="{A1CCF42C-534B-4F17-84EB-3026585EF5A2}" type="datetimeFigureOut">
               <a:rPr kumimoji="1" lang="ja-JP" altLang="en-US" smtClean="0"/>
-              <a:t>2022/12/27</a:t>
+              <a:t>2022/12/29</a:t>
             </a:fld>
             <a:endParaRPr kumimoji="1" lang="ja-JP" altLang="en-US"/>
           </a:p>
@@ -1566,7 +1566,7 @@
           <a:p>
             <a:fld id="{A1CCF42C-534B-4F17-84EB-3026585EF5A2}" type="datetimeFigureOut">
               <a:rPr kumimoji="1" lang="ja-JP" altLang="en-US" smtClean="0"/>
-              <a:t>2022/12/27</a:t>
+              <a:t>2022/12/29</a:t>
             </a:fld>
             <a:endParaRPr kumimoji="1" lang="ja-JP" altLang="en-US"/>
           </a:p>
@@ -2042,7 +2042,7 @@
           <a:p>
             <a:fld id="{A1CCF42C-534B-4F17-84EB-3026585EF5A2}" type="datetimeFigureOut">
               <a:rPr kumimoji="1" lang="ja-JP" altLang="en-US" smtClean="0"/>
-              <a:t>2022/12/27</a:t>
+              <a:t>2022/12/29</a:t>
             </a:fld>
             <a:endParaRPr kumimoji="1" lang="ja-JP" altLang="en-US"/>
           </a:p>
@@ -2183,7 +2183,7 @@
           <a:p>
             <a:fld id="{A1CCF42C-534B-4F17-84EB-3026585EF5A2}" type="datetimeFigureOut">
               <a:rPr kumimoji="1" lang="ja-JP" altLang="en-US" smtClean="0"/>
-              <a:t>2022/12/27</a:t>
+              <a:t>2022/12/29</a:t>
             </a:fld>
             <a:endParaRPr kumimoji="1" lang="ja-JP" altLang="en-US"/>
           </a:p>
@@ -2296,7 +2296,7 @@
           <a:p>
             <a:fld id="{A1CCF42C-534B-4F17-84EB-3026585EF5A2}" type="datetimeFigureOut">
               <a:rPr kumimoji="1" lang="ja-JP" altLang="en-US" smtClean="0"/>
-              <a:t>2022/12/27</a:t>
+              <a:t>2022/12/29</a:t>
             </a:fld>
             <a:endParaRPr kumimoji="1" lang="ja-JP" altLang="en-US"/>
           </a:p>
@@ -2639,7 +2639,7 @@
           <a:p>
             <a:fld id="{A1CCF42C-534B-4F17-84EB-3026585EF5A2}" type="datetimeFigureOut">
               <a:rPr kumimoji="1" lang="ja-JP" altLang="en-US" smtClean="0"/>
-              <a:t>2022/12/27</a:t>
+              <a:t>2022/12/29</a:t>
             </a:fld>
             <a:endParaRPr kumimoji="1" lang="ja-JP" altLang="en-US"/>
           </a:p>
@@ -2927,7 +2927,7 @@
           <a:p>
             <a:fld id="{A1CCF42C-534B-4F17-84EB-3026585EF5A2}" type="datetimeFigureOut">
               <a:rPr kumimoji="1" lang="ja-JP" altLang="en-US" smtClean="0"/>
-              <a:t>2022/12/27</a:t>
+              <a:t>2022/12/29</a:t>
             </a:fld>
             <a:endParaRPr kumimoji="1" lang="ja-JP" altLang="en-US"/>
           </a:p>
@@ -3200,7 +3200,7 @@
           <a:p>
             <a:fld id="{A1CCF42C-534B-4F17-84EB-3026585EF5A2}" type="datetimeFigureOut">
               <a:rPr kumimoji="1" lang="ja-JP" altLang="en-US" smtClean="0"/>
-              <a:t>2022/12/27</a:t>
+              <a:t>2022/12/29</a:t>
             </a:fld>
             <a:endParaRPr kumimoji="1" lang="ja-JP" altLang="en-US"/>
           </a:p>
@@ -4929,7 +4929,7 @@
         </p:nvSpPr>
         <p:spPr>
           <a:xfrm>
-            <a:off x="3484638" y="5191911"/>
+            <a:off x="3470723" y="5191911"/>
             <a:ext cx="746970" cy="369332"/>
           </a:xfrm>
           <a:prstGeom prst="rect">
@@ -4945,12 +4945,12 @@
           <a:p>
             <a:pPr algn="ctr"/>
             <a:r>
-              <a:rPr lang="en-US" altLang="ja-JP" dirty="0">
+              <a:rPr kumimoji="1" lang="en-US" altLang="ja-JP" dirty="0">
                 <a:solidFill>
                   <a:schemeClr val="accent2"/>
                 </a:solidFill>
               </a:rPr>
-              <a:t>1</a:t>
+              <a:t>0.99</a:t>
             </a:r>
             <a:endParaRPr kumimoji="1" lang="ja-JP" altLang="en-US" dirty="0">
               <a:solidFill>
@@ -5025,7 +5025,7 @@
         </p:nvSpPr>
         <p:spPr>
           <a:xfrm>
-            <a:off x="2092258" y="3402591"/>
+            <a:off x="1988278" y="3409434"/>
             <a:ext cx="746970" cy="369332"/>
           </a:xfrm>
           <a:prstGeom prst="rect">
@@ -5041,12 +5041,12 @@
           <a:p>
             <a:pPr algn="ctr"/>
             <a:r>
-              <a:rPr lang="en-US" altLang="ja-JP" dirty="0">
+              <a:rPr kumimoji="1" lang="en-US" altLang="ja-JP" dirty="0">
                 <a:solidFill>
                   <a:schemeClr val="accent2"/>
                 </a:solidFill>
               </a:rPr>
-              <a:t>1</a:t>
+              <a:t>0.99</a:t>
             </a:r>
             <a:endParaRPr kumimoji="1" lang="ja-JP" altLang="en-US" dirty="0">
               <a:solidFill>
@@ -5070,7 +5070,7 @@
         </p:nvSpPr>
         <p:spPr>
           <a:xfrm>
-            <a:off x="4084636" y="2252347"/>
+            <a:off x="4238335" y="2247754"/>
             <a:ext cx="746970" cy="369332"/>
           </a:xfrm>
           <a:prstGeom prst="rect">
@@ -5086,12 +5086,12 @@
           <a:p>
             <a:pPr algn="ctr"/>
             <a:r>
-              <a:rPr lang="en-US" altLang="ja-JP" dirty="0">
+              <a:rPr kumimoji="1" lang="en-US" altLang="ja-JP" dirty="0">
                 <a:solidFill>
                   <a:schemeClr val="accent2"/>
                 </a:solidFill>
               </a:rPr>
-              <a:t>1</a:t>
+              <a:t>0.99</a:t>
             </a:r>
             <a:endParaRPr kumimoji="1" lang="ja-JP" altLang="en-US" dirty="0">
               <a:solidFill>
@@ -5258,7 +5258,7 @@
         </p:nvSpPr>
         <p:spPr>
           <a:xfrm>
-            <a:off x="6292984" y="5848522"/>
+            <a:off x="6292984" y="5717835"/>
             <a:ext cx="746970" cy="369332"/>
           </a:xfrm>
           <a:prstGeom prst="rect">
@@ -5274,12 +5274,12 @@
           <a:p>
             <a:pPr algn="ctr"/>
             <a:r>
-              <a:rPr lang="en-US" altLang="ja-JP" dirty="0">
+              <a:rPr kumimoji="1" lang="en-US" altLang="ja-JP" dirty="0">
                 <a:solidFill>
                   <a:schemeClr val="accent2"/>
                 </a:solidFill>
               </a:rPr>
-              <a:t>1</a:t>
+              <a:t>0.99</a:t>
             </a:r>
             <a:endParaRPr kumimoji="1" lang="ja-JP" altLang="en-US" dirty="0">
               <a:solidFill>
@@ -5354,7 +5354,7 @@
         </p:nvSpPr>
         <p:spPr>
           <a:xfrm>
-            <a:off x="7139985" y="3402591"/>
+            <a:off x="7248257" y="3391186"/>
             <a:ext cx="746970" cy="369332"/>
           </a:xfrm>
           <a:prstGeom prst="rect">
@@ -5370,12 +5370,12 @@
           <a:p>
             <a:pPr algn="ctr"/>
             <a:r>
-              <a:rPr lang="en-US" altLang="ja-JP" dirty="0">
+              <a:rPr kumimoji="1" lang="en-US" altLang="ja-JP" dirty="0">
                 <a:solidFill>
                   <a:schemeClr val="accent2"/>
                 </a:solidFill>
               </a:rPr>
-              <a:t>1</a:t>
+              <a:t>0.99</a:t>
             </a:r>
             <a:endParaRPr kumimoji="1" lang="ja-JP" altLang="en-US" dirty="0">
               <a:solidFill>
@@ -7576,10 +7576,10 @@
       </p:sp>
       <p:pic>
         <p:nvPicPr>
-          <p:cNvPr id="1028" name="Picture 4">
-            <a:extLst>
-              <a:ext uri="{FF2B5EF4-FFF2-40B4-BE49-F238E27FC236}">
-                <a16:creationId xmlns:a16="http://schemas.microsoft.com/office/drawing/2014/main" id="{040ECDEE-7FC4-56AB-70D4-E46AA3258F53}"/>
+          <p:cNvPr id="7" name="Picture 2">
+            <a:extLst>
+              <a:ext uri="{FF2B5EF4-FFF2-40B4-BE49-F238E27FC236}">
+                <a16:creationId xmlns:a16="http://schemas.microsoft.com/office/drawing/2014/main" id="{0DF53373-098A-D488-E5C6-04311F359865}"/>
               </a:ext>
             </a:extLst>
           </p:cNvPr>
@@ -7603,8 +7603,8 @@
         </p:blipFill>
         <p:spPr bwMode="auto">
           <a:xfrm>
-            <a:off x="6096000" y="3760720"/>
-            <a:ext cx="4838700" cy="2429869"/>
+            <a:off x="6971112" y="4253013"/>
+            <a:ext cx="4147083" cy="1840492"/>
           </a:xfrm>
           <a:prstGeom prst="rect">
             <a:avLst/>
@@ -7621,6 +7621,48 @@
           </a:extLst>
         </p:spPr>
       </p:pic>
+      <p:sp>
+        <p:nvSpPr>
+          <p:cNvPr id="9" name="テキスト ボックス 8">
+            <a:extLst>
+              <a:ext uri="{FF2B5EF4-FFF2-40B4-BE49-F238E27FC236}">
+                <a16:creationId xmlns:a16="http://schemas.microsoft.com/office/drawing/2014/main" id="{02DA94A4-1686-97FF-E90E-3BE20AB5C660}"/>
+              </a:ext>
+            </a:extLst>
+          </p:cNvPr>
+          <p:cNvSpPr txBox="1"/>
+          <p:nvPr/>
+        </p:nvSpPr>
+        <p:spPr>
+          <a:xfrm>
+            <a:off x="8874825" y="5906705"/>
+            <a:ext cx="974889" cy="369332"/>
+          </a:xfrm>
+          <a:prstGeom prst="rect">
+            <a:avLst/>
+          </a:prstGeom>
+          <a:noFill/>
+        </p:spPr>
+        <p:txBody>
+          <a:bodyPr wrap="square">
+            <a:spAutoFit/>
+          </a:bodyPr>
+          <a:lstStyle/>
+          <a:p>
+            <a:pPr algn="l"/>
+            <a:r>
+              <a:rPr lang="en-US" altLang="ja-JP" b="1" i="0" dirty="0">
+                <a:solidFill>
+                  <a:srgbClr val="000000"/>
+                </a:solidFill>
+                <a:effectLst/>
+                <a:latin typeface="arial" panose="020B0604020202020204" pitchFamily="34" charset="0"/>
+              </a:rPr>
+              <a:t>SNFG</a:t>
+            </a:r>
+          </a:p>
+        </p:txBody>
+      </p:sp>
     </p:spTree>
     <p:extLst>
       <p:ext uri="{BB962C8B-B14F-4D97-AF65-F5344CB8AC3E}">
@@ -9394,10 +9436,10 @@
       </p:sp>
       <p:pic>
         <p:nvPicPr>
-          <p:cNvPr id="2050" name="Picture 2">
-            <a:extLst>
-              <a:ext uri="{FF2B5EF4-FFF2-40B4-BE49-F238E27FC236}">
-                <a16:creationId xmlns:a16="http://schemas.microsoft.com/office/drawing/2014/main" id="{346F9123-CD21-00A0-2BD9-1AB620AEC838}"/>
+          <p:cNvPr id="3" name="Picture 2">
+            <a:extLst>
+              <a:ext uri="{FF2B5EF4-FFF2-40B4-BE49-F238E27FC236}">
+                <a16:creationId xmlns:a16="http://schemas.microsoft.com/office/drawing/2014/main" id="{3960CA52-49AB-B17A-CDE4-C35BC6983D1F}"/>
               </a:ext>
             </a:extLst>
           </p:cNvPr>
@@ -9421,8 +9463,8 @@
         </p:blipFill>
         <p:spPr bwMode="auto">
           <a:xfrm>
-            <a:off x="6305550" y="3733346"/>
-            <a:ext cx="5105400" cy="2563799"/>
+            <a:off x="6966474" y="3720806"/>
+            <a:ext cx="4050416" cy="3038907"/>
           </a:xfrm>
           <a:prstGeom prst="rect">
             <a:avLst/>
@@ -10558,10 +10600,10 @@
       </p:sp>
       <p:pic>
         <p:nvPicPr>
-          <p:cNvPr id="3074" name="Picture 2">
-            <a:extLst>
-              <a:ext uri="{FF2B5EF4-FFF2-40B4-BE49-F238E27FC236}">
-                <a16:creationId xmlns:a16="http://schemas.microsoft.com/office/drawing/2014/main" id="{687433B0-DC10-8E3E-52D6-CE13A8E7DF19}"/>
+          <p:cNvPr id="6" name="Picture 2">
+            <a:extLst>
+              <a:ext uri="{FF2B5EF4-FFF2-40B4-BE49-F238E27FC236}">
+                <a16:creationId xmlns:a16="http://schemas.microsoft.com/office/drawing/2014/main" id="{AF68EE7F-320F-87B6-BC6A-C2CCB40429F3}"/>
               </a:ext>
             </a:extLst>
           </p:cNvPr>
@@ -10585,8 +10627,8 @@
         </p:blipFill>
         <p:spPr bwMode="auto">
           <a:xfrm>
-            <a:off x="6175485" y="3646380"/>
-            <a:ext cx="5466399" cy="2745083"/>
+            <a:off x="6976277" y="3953803"/>
+            <a:ext cx="4538975" cy="2267034"/>
           </a:xfrm>
           <a:prstGeom prst="rect">
             <a:avLst/>

</xml_diff>